<commit_message>
Updated Topology possibilities diagram
</commit_message>
<xml_diff>
--- a/diagrams/Diagram Topology possibilities.pptx
+++ b/diagrams/Diagram Topology possibilities.pptx
@@ -111,6 +111,9 @@
     <p:ext uri="{EFAFB233-063F-42B5-8137-9DF3F51BA10A}">
       <p15:sldGuideLst xmlns:p15="http://schemas.microsoft.com/office/powerpoint/2012/main"/>
     </p:ext>
+    <p:ext uri="{2D200454-40CA-4A62-9FC3-DE9A4176ACB9}">
+      <p15:notesGuideLst xmlns:p15="http://schemas.microsoft.com/office/powerpoint/2012/main"/>
+    </p:ext>
   </p:extLst>
 </p:presentation>
 </file>
@@ -197,7 +200,7 @@
           <a:p>
             <a:fld id="{7D413008-A39C-A34B-B4D3-5820DB5ACB60}" type="datetimeFigureOut">
               <a:rPr lang="en-ES" smtClean="0"/>
-              <a:t>30/04/2020</a:t>
+              <a:t>01/05/2020</a:t>
             </a:fld>
             <a:endParaRPr lang="en-ES"/>
           </a:p>
@@ -721,7 +724,7 @@
           <a:p>
             <a:fld id="{E7591B8B-EB8D-1840-B3EC-BD126BB84091}" type="datetimeFigureOut">
               <a:rPr lang="en-ES" smtClean="0"/>
-              <a:t>30/04/2020</a:t>
+              <a:t>01/05/2020</a:t>
             </a:fld>
             <a:endParaRPr lang="en-ES"/>
           </a:p>
@@ -891,7 +894,7 @@
           <a:p>
             <a:fld id="{E7591B8B-EB8D-1840-B3EC-BD126BB84091}" type="datetimeFigureOut">
               <a:rPr lang="en-ES" smtClean="0"/>
-              <a:t>30/04/2020</a:t>
+              <a:t>01/05/2020</a:t>
             </a:fld>
             <a:endParaRPr lang="en-ES"/>
           </a:p>
@@ -1071,7 +1074,7 @@
           <a:p>
             <a:fld id="{E7591B8B-EB8D-1840-B3EC-BD126BB84091}" type="datetimeFigureOut">
               <a:rPr lang="en-ES" smtClean="0"/>
-              <a:t>30/04/2020</a:t>
+              <a:t>01/05/2020</a:t>
             </a:fld>
             <a:endParaRPr lang="en-ES"/>
           </a:p>
@@ -1241,7 +1244,7 @@
           <a:p>
             <a:fld id="{E7591B8B-EB8D-1840-B3EC-BD126BB84091}" type="datetimeFigureOut">
               <a:rPr lang="en-ES" smtClean="0"/>
-              <a:t>30/04/2020</a:t>
+              <a:t>01/05/2020</a:t>
             </a:fld>
             <a:endParaRPr lang="en-ES"/>
           </a:p>
@@ -1485,7 +1488,7 @@
           <a:p>
             <a:fld id="{E7591B8B-EB8D-1840-B3EC-BD126BB84091}" type="datetimeFigureOut">
               <a:rPr lang="en-ES" smtClean="0"/>
-              <a:t>30/04/2020</a:t>
+              <a:t>01/05/2020</a:t>
             </a:fld>
             <a:endParaRPr lang="en-ES"/>
           </a:p>
@@ -1717,7 +1720,7 @@
           <a:p>
             <a:fld id="{E7591B8B-EB8D-1840-B3EC-BD126BB84091}" type="datetimeFigureOut">
               <a:rPr lang="en-ES" smtClean="0"/>
-              <a:t>30/04/2020</a:t>
+              <a:t>01/05/2020</a:t>
             </a:fld>
             <a:endParaRPr lang="en-ES"/>
           </a:p>
@@ -2084,7 +2087,7 @@
           <a:p>
             <a:fld id="{E7591B8B-EB8D-1840-B3EC-BD126BB84091}" type="datetimeFigureOut">
               <a:rPr lang="en-ES" smtClean="0"/>
-              <a:t>30/04/2020</a:t>
+              <a:t>01/05/2020</a:t>
             </a:fld>
             <a:endParaRPr lang="en-ES"/>
           </a:p>
@@ -2202,7 +2205,7 @@
           <a:p>
             <a:fld id="{E7591B8B-EB8D-1840-B3EC-BD126BB84091}" type="datetimeFigureOut">
               <a:rPr lang="en-ES" smtClean="0"/>
-              <a:t>30/04/2020</a:t>
+              <a:t>01/05/2020</a:t>
             </a:fld>
             <a:endParaRPr lang="en-ES"/>
           </a:p>
@@ -2297,7 +2300,7 @@
           <a:p>
             <a:fld id="{E7591B8B-EB8D-1840-B3EC-BD126BB84091}" type="datetimeFigureOut">
               <a:rPr lang="en-ES" smtClean="0"/>
-              <a:t>30/04/2020</a:t>
+              <a:t>01/05/2020</a:t>
             </a:fld>
             <a:endParaRPr lang="en-ES"/>
           </a:p>
@@ -2574,7 +2577,7 @@
           <a:p>
             <a:fld id="{E7591B8B-EB8D-1840-B3EC-BD126BB84091}" type="datetimeFigureOut">
               <a:rPr lang="en-ES" smtClean="0"/>
-              <a:t>30/04/2020</a:t>
+              <a:t>01/05/2020</a:t>
             </a:fld>
             <a:endParaRPr lang="en-ES"/>
           </a:p>
@@ -2831,7 +2834,7 @@
           <a:p>
             <a:fld id="{E7591B8B-EB8D-1840-B3EC-BD126BB84091}" type="datetimeFigureOut">
               <a:rPr lang="en-ES" smtClean="0"/>
-              <a:t>30/04/2020</a:t>
+              <a:t>01/05/2020</a:t>
             </a:fld>
             <a:endParaRPr lang="en-ES"/>
           </a:p>
@@ -3044,7 +3047,7 @@
           <a:p>
             <a:fld id="{E7591B8B-EB8D-1840-B3EC-BD126BB84091}" type="datetimeFigureOut">
               <a:rPr lang="en-ES" smtClean="0"/>
-              <a:t>30/04/2020</a:t>
+              <a:t>01/05/2020</a:t>
             </a:fld>
             <a:endParaRPr lang="en-ES"/>
           </a:p>
@@ -4904,6 +4907,7 @@
             <a:solidFill>
               <a:schemeClr val="tx1"/>
             </a:solidFill>
+            <a:prstDash val="dash"/>
             <a:tailEnd type="triangle"/>
           </a:ln>
         </p:spPr>
@@ -4948,6 +4952,7 @@
             <a:solidFill>
               <a:schemeClr val="tx1"/>
             </a:solidFill>
+            <a:prstDash val="dash"/>
             <a:tailEnd type="triangle"/>
           </a:ln>
         </p:spPr>
@@ -4992,6 +4997,7 @@
             <a:solidFill>
               <a:schemeClr val="tx1"/>
             </a:solidFill>
+            <a:prstDash val="dash"/>
             <a:tailEnd type="triangle"/>
           </a:ln>
         </p:spPr>
@@ -5071,6 +5077,7 @@
             <a:solidFill>
               <a:schemeClr val="tx1"/>
             </a:solidFill>
+            <a:prstDash val="dash"/>
             <a:tailEnd type="triangle"/>
           </a:ln>
         </p:spPr>
@@ -5115,6 +5122,7 @@
             <a:solidFill>
               <a:schemeClr val="tx1"/>
             </a:solidFill>
+            <a:prstDash val="dash"/>
             <a:tailEnd type="triangle"/>
           </a:ln>
         </p:spPr>
@@ -5159,6 +5167,7 @@
             <a:solidFill>
               <a:schemeClr val="tx1"/>
             </a:solidFill>
+            <a:prstDash val="dash"/>
             <a:tailEnd type="triangle"/>
           </a:ln>
         </p:spPr>
@@ -5203,6 +5212,7 @@
             <a:solidFill>
               <a:schemeClr val="tx1"/>
             </a:solidFill>
+            <a:prstDash val="dash"/>
             <a:tailEnd type="triangle"/>
           </a:ln>
         </p:spPr>
@@ -5247,6 +5257,7 @@
             <a:solidFill>
               <a:schemeClr val="tx1"/>
             </a:solidFill>
+            <a:prstDash val="dash"/>
             <a:tailEnd type="triangle"/>
           </a:ln>
         </p:spPr>
@@ -5296,6 +5307,159 @@
             <a:r>
               <a:rPr lang="en-ES" b="1" dirty="0"/>
               <a:t>publicAddress</a:t>
+            </a:r>
+          </a:p>
+        </p:txBody>
+      </p:sp>
+      <p:cxnSp>
+        <p:nvCxnSpPr>
+          <p:cNvPr id="41" name="Straight Arrow Connector 40">
+            <a:extLst>
+              <a:ext uri="{FF2B5EF4-FFF2-40B4-BE49-F238E27FC236}">
+                <a16:creationId xmlns:a16="http://schemas.microsoft.com/office/drawing/2014/main" id="{0BF59FDB-7013-3C42-9CD4-251B23CDBF44}"/>
+              </a:ext>
+            </a:extLst>
+          </p:cNvPr>
+          <p:cNvCxnSpPr>
+            <a:cxnSpLocks/>
+          </p:cNvCxnSpPr>
+          <p:nvPr/>
+        </p:nvCxnSpPr>
+        <p:spPr>
+          <a:xfrm flipH="1">
+            <a:off x="8254636" y="1050285"/>
+            <a:ext cx="1810523" cy="1738570"/>
+          </a:xfrm>
+          <a:prstGeom prst="straightConnector1">
+            <a:avLst/>
+          </a:prstGeom>
+          <a:ln w="25400">
+            <a:solidFill>
+              <a:schemeClr val="tx1"/>
+            </a:solidFill>
+            <a:prstDash val="dash"/>
+            <a:tailEnd type="triangle"/>
+          </a:ln>
+        </p:spPr>
+        <p:style>
+          <a:lnRef idx="1">
+            <a:schemeClr val="accent1"/>
+          </a:lnRef>
+          <a:fillRef idx="0">
+            <a:schemeClr val="accent1"/>
+          </a:fillRef>
+          <a:effectRef idx="0">
+            <a:schemeClr val="accent1"/>
+          </a:effectRef>
+          <a:fontRef idx="minor">
+            <a:schemeClr val="tx1"/>
+          </a:fontRef>
+        </p:style>
+      </p:cxnSp>
+      <p:sp>
+        <p:nvSpPr>
+          <p:cNvPr id="3" name="Rectangle 2">
+            <a:extLst>
+              <a:ext uri="{FF2B5EF4-FFF2-40B4-BE49-F238E27FC236}">
+                <a16:creationId xmlns:a16="http://schemas.microsoft.com/office/drawing/2014/main" id="{74742533-AE3B-7D41-82D2-0CB5331196A4}"/>
+              </a:ext>
+            </a:extLst>
+          </p:cNvPr>
+          <p:cNvSpPr/>
+          <p:nvPr/>
+        </p:nvSpPr>
+        <p:spPr>
+          <a:xfrm>
+            <a:off x="10065159" y="605697"/>
+            <a:ext cx="3743761" cy="1022382"/>
+          </a:xfrm>
+          <a:prstGeom prst="rect">
+            <a:avLst/>
+          </a:prstGeom>
+          <a:noFill/>
+          <a:ln w="25400">
+            <a:solidFill>
+              <a:schemeClr val="tx1"/>
+            </a:solidFill>
+            <a:prstDash val="dash"/>
+          </a:ln>
+        </p:spPr>
+        <p:style>
+          <a:lnRef idx="2">
+            <a:schemeClr val="accent1">
+              <a:shade val="50000"/>
+            </a:schemeClr>
+          </a:lnRef>
+          <a:fillRef idx="1">
+            <a:schemeClr val="accent1"/>
+          </a:fillRef>
+          <a:effectRef idx="0">
+            <a:schemeClr val="accent1"/>
+          </a:effectRef>
+          <a:fontRef idx="minor">
+            <a:schemeClr val="lt1"/>
+          </a:fontRef>
+        </p:style>
+        <p:txBody>
+          <a:bodyPr rtlCol="0" anchor="ctr"/>
+          <a:lstStyle/>
+          <a:p>
+            <a:pPr algn="ctr"/>
+            <a:endParaRPr lang="en-ES"/>
+          </a:p>
+        </p:txBody>
+      </p:sp>
+      <p:sp>
+        <p:nvSpPr>
+          <p:cNvPr id="5" name="TextBox 4">
+            <a:extLst>
+              <a:ext uri="{FF2B5EF4-FFF2-40B4-BE49-F238E27FC236}">
+                <a16:creationId xmlns:a16="http://schemas.microsoft.com/office/drawing/2014/main" id="{B0929742-9FDC-ED4D-9499-8DDB441C1179}"/>
+              </a:ext>
+            </a:extLst>
+          </p:cNvPr>
+          <p:cNvSpPr txBox="1"/>
+          <p:nvPr/>
+        </p:nvSpPr>
+        <p:spPr>
+          <a:xfrm>
+            <a:off x="10163641" y="680953"/>
+            <a:ext cx="3527825" cy="923330"/>
+          </a:xfrm>
+          <a:prstGeom prst="rect">
+            <a:avLst/>
+          </a:prstGeom>
+          <a:noFill/>
+        </p:spPr>
+        <p:txBody>
+          <a:bodyPr wrap="square" rtlCol="0">
+            <a:spAutoFit/>
+          </a:bodyPr>
+          <a:lstStyle/>
+          <a:p>
+            <a:r>
+              <a:rPr lang="en-ES" dirty="0"/>
+              <a:t>Each router has a text identifier </a:t>
+            </a:r>
+          </a:p>
+          <a:p>
+            <a:r>
+              <a:rPr lang="en-ES" dirty="0"/>
+              <a:t>called </a:t>
+            </a:r>
+            <a:r>
+              <a:rPr lang="en-ES" b="1" dirty="0"/>
+              <a:t>dRouter </a:t>
+            </a:r>
+            <a:r>
+              <a:rPr lang="en-ES" dirty="0"/>
+              <a:t>(deployment router)</a:t>
+            </a:r>
+          </a:p>
+          <a:p>
+            <a:r>
+              <a:rPr lang="en-ES" dirty="0"/>
+              <a:t>in gslb-tool </a:t>
             </a:r>
           </a:p>
         </p:txBody>

</xml_diff>